<commit_message>
Update v4 migration after feedback from customer
</commit_message>
<xml_diff>
--- a/content/developerportal/deploy/attachments/migrating-to-v4/migratev4.pptx
+++ b/content/developerportal/deploy/attachments/migrating-to-v4/migratev4.pptx
@@ -104,6 +104,11 @@
       </a:defRPr>
     </a:lvl9pPr>
   </p:defaultTextStyle>
+  <p:extLst>
+    <p:ext uri="{EFAFB233-063F-42B5-8137-9DF3F51BA10A}">
+      <p15:sldGuideLst xmlns:p15="http://schemas.microsoft.com/office/powerpoint/2012/main"/>
+    </p:ext>
+  </p:extLst>
 </p:presentation>
 </file>
 
@@ -254,7 +259,7 @@
           <a:p>
             <a:fld id="{28FD1876-3828-4D76-A242-30A1FDBF565F}" type="datetimeFigureOut">
               <a:rPr lang="en-US" smtClean="0"/>
-              <a:t>8/1/2019</a:t>
+              <a:t>10/22/2019</a:t>
             </a:fld>
             <a:endParaRPr lang="en-US"/>
           </a:p>
@@ -452,7 +457,7 @@
           <a:p>
             <a:fld id="{28FD1876-3828-4D76-A242-30A1FDBF565F}" type="datetimeFigureOut">
               <a:rPr lang="en-US" smtClean="0"/>
-              <a:t>8/1/2019</a:t>
+              <a:t>10/22/2019</a:t>
             </a:fld>
             <a:endParaRPr lang="en-US"/>
           </a:p>
@@ -660,7 +665,7 @@
           <a:p>
             <a:fld id="{28FD1876-3828-4D76-A242-30A1FDBF565F}" type="datetimeFigureOut">
               <a:rPr lang="en-US" smtClean="0"/>
-              <a:t>8/1/2019</a:t>
+              <a:t>10/22/2019</a:t>
             </a:fld>
             <a:endParaRPr lang="en-US"/>
           </a:p>
@@ -858,7 +863,7 @@
           <a:p>
             <a:fld id="{28FD1876-3828-4D76-A242-30A1FDBF565F}" type="datetimeFigureOut">
               <a:rPr lang="en-US" smtClean="0"/>
-              <a:t>8/1/2019</a:t>
+              <a:t>10/22/2019</a:t>
             </a:fld>
             <a:endParaRPr lang="en-US"/>
           </a:p>
@@ -1133,7 +1138,7 @@
           <a:p>
             <a:fld id="{28FD1876-3828-4D76-A242-30A1FDBF565F}" type="datetimeFigureOut">
               <a:rPr lang="en-US" smtClean="0"/>
-              <a:t>8/1/2019</a:t>
+              <a:t>10/22/2019</a:t>
             </a:fld>
             <a:endParaRPr lang="en-US"/>
           </a:p>
@@ -1398,7 +1403,7 @@
           <a:p>
             <a:fld id="{28FD1876-3828-4D76-A242-30A1FDBF565F}" type="datetimeFigureOut">
               <a:rPr lang="en-US" smtClean="0"/>
-              <a:t>8/1/2019</a:t>
+              <a:t>10/22/2019</a:t>
             </a:fld>
             <a:endParaRPr lang="en-US"/>
           </a:p>
@@ -1810,7 +1815,7 @@
           <a:p>
             <a:fld id="{28FD1876-3828-4D76-A242-30A1FDBF565F}" type="datetimeFigureOut">
               <a:rPr lang="en-US" smtClean="0"/>
-              <a:t>8/1/2019</a:t>
+              <a:t>10/22/2019</a:t>
             </a:fld>
             <a:endParaRPr lang="en-US"/>
           </a:p>
@@ -1951,7 +1956,7 @@
           <a:p>
             <a:fld id="{28FD1876-3828-4D76-A242-30A1FDBF565F}" type="datetimeFigureOut">
               <a:rPr lang="en-US" smtClean="0"/>
-              <a:t>8/1/2019</a:t>
+              <a:t>10/22/2019</a:t>
             </a:fld>
             <a:endParaRPr lang="en-US"/>
           </a:p>
@@ -2064,7 +2069,7 @@
           <a:p>
             <a:fld id="{28FD1876-3828-4D76-A242-30A1FDBF565F}" type="datetimeFigureOut">
               <a:rPr lang="en-US" smtClean="0"/>
-              <a:t>8/1/2019</a:t>
+              <a:t>10/22/2019</a:t>
             </a:fld>
             <a:endParaRPr lang="en-US"/>
           </a:p>
@@ -2375,7 +2380,7 @@
           <a:p>
             <a:fld id="{28FD1876-3828-4D76-A242-30A1FDBF565F}" type="datetimeFigureOut">
               <a:rPr lang="en-US" smtClean="0"/>
-              <a:t>8/1/2019</a:t>
+              <a:t>10/22/2019</a:t>
             </a:fld>
             <a:endParaRPr lang="en-US"/>
           </a:p>
@@ -2663,7 +2668,7 @@
           <a:p>
             <a:fld id="{28FD1876-3828-4D76-A242-30A1FDBF565F}" type="datetimeFigureOut">
               <a:rPr lang="en-US" smtClean="0"/>
-              <a:t>8/1/2019</a:t>
+              <a:t>10/22/2019</a:t>
             </a:fld>
             <a:endParaRPr lang="en-US"/>
           </a:p>
@@ -2904,7 +2909,7 @@
           <a:p>
             <a:fld id="{28FD1876-3828-4D76-A242-30A1FDBF565F}" type="datetimeFigureOut">
               <a:rPr lang="en-US" smtClean="0"/>
-              <a:t>8/1/2019</a:t>
+              <a:t>10/22/2019</a:t>
             </a:fld>
             <a:endParaRPr lang="en-US"/>
           </a:p>
@@ -3335,7 +3340,7 @@
         </p:nvSpPr>
         <p:spPr>
           <a:xfrm>
-            <a:off x="0" y="-1577"/>
+            <a:off x="0" y="0"/>
             <a:ext cx="12192000" cy="6858000"/>
           </a:xfrm>
           <a:prstGeom prst="rect">
@@ -3389,7 +3394,7 @@
         </p:nvSpPr>
         <p:spPr>
           <a:xfrm>
-            <a:off x="1072055" y="220717"/>
+            <a:off x="1299079" y="222294"/>
             <a:ext cx="2062130" cy="1967536"/>
           </a:xfrm>
           <a:prstGeom prst="roundRect">
@@ -3438,7 +3443,7 @@
         </p:nvSpPr>
         <p:spPr>
           <a:xfrm>
-            <a:off x="6824367" y="220717"/>
+            <a:off x="7051391" y="222294"/>
             <a:ext cx="2062130" cy="1967536"/>
           </a:xfrm>
           <a:prstGeom prst="roundRect">
@@ -3487,7 +3492,7 @@
         </p:nvSpPr>
         <p:spPr>
           <a:xfrm>
-            <a:off x="1072055" y="3427423"/>
+            <a:off x="1299079" y="3429000"/>
             <a:ext cx="2062130" cy="1967536"/>
           </a:xfrm>
           <a:prstGeom prst="roundRect">
@@ -3543,7 +3548,7 @@
         </p:nvSpPr>
         <p:spPr>
           <a:xfrm>
-            <a:off x="6824367" y="3425846"/>
+            <a:off x="7051391" y="3427423"/>
             <a:ext cx="2062130" cy="1967536"/>
           </a:xfrm>
           <a:prstGeom prst="roundRect">
@@ -3602,7 +3607,7 @@
         </p:nvCxnSpPr>
         <p:spPr>
           <a:xfrm>
-            <a:off x="7855432" y="2186676"/>
+            <a:off x="8082456" y="2188253"/>
             <a:ext cx="0" cy="1239170"/>
           </a:xfrm>
           <a:prstGeom prst="straightConnector1">
@@ -3644,7 +3649,7 @@
         </p:nvCxnSpPr>
         <p:spPr>
           <a:xfrm flipV="1">
-            <a:off x="3134185" y="4409614"/>
+            <a:off x="3361209" y="4411191"/>
             <a:ext cx="3690182" cy="1577"/>
           </a:xfrm>
           <a:prstGeom prst="straightConnector1">
@@ -3684,7 +3689,7 @@
         </p:nvCxnSpPr>
         <p:spPr>
           <a:xfrm>
-            <a:off x="3134185" y="1198179"/>
+            <a:off x="3361209" y="1199756"/>
             <a:ext cx="3690182" cy="2692751"/>
           </a:xfrm>
           <a:prstGeom prst="bentConnector3">
@@ -3726,7 +3731,7 @@
         </p:nvCxnSpPr>
         <p:spPr>
           <a:xfrm>
-            <a:off x="2103120" y="2188253"/>
+            <a:off x="2330144" y="2189830"/>
             <a:ext cx="0" cy="1239170"/>
           </a:xfrm>
           <a:prstGeom prst="line">
@@ -3790,7 +3795,7 @@
         </p:blipFill>
         <p:spPr>
           <a:xfrm>
-            <a:off x="1807277" y="5970676"/>
+            <a:off x="2034301" y="5972253"/>
             <a:ext cx="591685" cy="800957"/>
           </a:xfrm>
           <a:prstGeom prst="rect">
@@ -3814,7 +3819,7 @@
         </p:nvCxnSpPr>
         <p:spPr>
           <a:xfrm flipH="1">
-            <a:off x="8886498" y="3890930"/>
+            <a:off x="9113522" y="3892507"/>
             <a:ext cx="2656943" cy="0"/>
           </a:xfrm>
           <a:prstGeom prst="straightConnector1">
@@ -3853,7 +3858,7 @@
         </p:nvCxnSpPr>
         <p:spPr>
           <a:xfrm flipH="1">
-            <a:off x="8886497" y="4416489"/>
+            <a:off x="9113521" y="4418066"/>
             <a:ext cx="2656944" cy="0"/>
           </a:xfrm>
           <a:prstGeom prst="straightConnector1">
@@ -3892,7 +3897,7 @@
         </p:nvSpPr>
         <p:spPr>
           <a:xfrm>
-            <a:off x="7855431" y="2483095"/>
+            <a:off x="8082455" y="2484672"/>
             <a:ext cx="2182342" cy="646331"/>
           </a:xfrm>
           <a:prstGeom prst="rect">
@@ -3909,7 +3914,7 @@
             <a:pPr algn="ctr"/>
             <a:r>
               <a:rPr lang="en-US" dirty="0"/>
-              <a:t>1. Link the new Free App to the V4 node</a:t>
+              <a:t>1. Link the new Free App to the v4 node</a:t>
             </a:r>
           </a:p>
         </p:txBody>
@@ -3928,7 +3933,7 @@
         </p:nvSpPr>
         <p:spPr>
           <a:xfrm>
-            <a:off x="3320715" y="4075903"/>
+            <a:off x="3547739" y="4077480"/>
             <a:ext cx="3320717" cy="923330"/>
           </a:xfrm>
           <a:prstGeom prst="rect">
@@ -3945,7 +3950,7 @@
             <a:pPr algn="ctr"/>
             <a:r>
               <a:rPr lang="en-US" dirty="0"/>
-              <a:t>2. Copy the deployment package and data from the V3 node to the V4 node</a:t>
+              <a:t>2. Copy the deployment package and data from the v3 node to the v4 node</a:t>
             </a:r>
           </a:p>
         </p:txBody>
@@ -3964,7 +3969,7 @@
         </p:nvSpPr>
         <p:spPr>
           <a:xfrm>
-            <a:off x="3018208" y="2483094"/>
+            <a:off x="3245232" y="2484671"/>
             <a:ext cx="1961067" cy="646331"/>
           </a:xfrm>
           <a:prstGeom prst="rect">
@@ -3981,7 +3986,7 @@
             <a:pPr algn="ctr"/>
             <a:r>
               <a:rPr lang="en-US" dirty="0"/>
-              <a:t>3. Link the app to the V4 node</a:t>
+              <a:t>4. Link the app to the v4 node</a:t>
             </a:r>
           </a:p>
         </p:txBody>
@@ -4000,7 +4005,7 @@
         </p:nvSpPr>
         <p:spPr>
           <a:xfrm>
-            <a:off x="8883660" y="3507379"/>
+            <a:off x="9110684" y="3508956"/>
             <a:ext cx="2656943" cy="369332"/>
           </a:xfrm>
           <a:prstGeom prst="rect">
@@ -4016,7 +4021,7 @@
           <a:p>
             <a:r>
               <a:rPr lang="en-US" dirty="0"/>
-              <a:t>4. Change the app URL</a:t>
+              <a:t>5. Change the app URL</a:t>
             </a:r>
           </a:p>
         </p:txBody>
@@ -4035,7 +4040,7 @@
         </p:nvSpPr>
         <p:spPr>
           <a:xfrm>
-            <a:off x="8883659" y="4032937"/>
+            <a:off x="9110683" y="4034514"/>
             <a:ext cx="2783535" cy="369332"/>
           </a:xfrm>
           <a:prstGeom prst="rect">
@@ -4051,7 +4056,7 @@
           <a:p>
             <a:r>
               <a:rPr lang="en-US" dirty="0"/>
-              <a:t>5. Change a custom domain</a:t>
+              <a:t>6. Change a custom domain</a:t>
             </a:r>
           </a:p>
         </p:txBody>
@@ -4073,7 +4078,7 @@
         </p:nvCxnSpPr>
         <p:spPr>
           <a:xfrm>
-            <a:off x="2103120" y="5394959"/>
+            <a:off x="2330144" y="5396536"/>
             <a:ext cx="0" cy="575717"/>
           </a:xfrm>
           <a:prstGeom prst="straightConnector1">
@@ -4112,7 +4117,7 @@
         </p:nvSpPr>
         <p:spPr>
           <a:xfrm>
-            <a:off x="2103120" y="5498151"/>
+            <a:off x="2330144" y="5499728"/>
             <a:ext cx="2453438" cy="369332"/>
           </a:xfrm>
           <a:prstGeom prst="rect">
@@ -4129,7 +4134,7 @@
             <a:pPr algn="ctr"/>
             <a:r>
               <a:rPr lang="en-US" dirty="0"/>
-              <a:t>6. Offboard the V3 node</a:t>
+              <a:t>7. Offboard the v3 node</a:t>
             </a:r>
           </a:p>
         </p:txBody>
@@ -4165,7 +4170,7 @@
         </p:blipFill>
         <p:spPr>
           <a:xfrm>
-            <a:off x="1645919" y="2350638"/>
+            <a:off x="1872943" y="2352215"/>
             <a:ext cx="914400" cy="914400"/>
           </a:xfrm>
           <a:prstGeom prst="rect">
@@ -4173,6 +4178,42 @@
           </a:prstGeom>
         </p:spPr>
       </p:pic>
+      <p:sp>
+        <p:nvSpPr>
+          <p:cNvPr id="23" name="TextBox 22">
+            <a:extLst>
+              <a:ext uri="{FF2B5EF4-FFF2-40B4-BE49-F238E27FC236}">
+                <a16:creationId xmlns:a16="http://schemas.microsoft.com/office/drawing/2014/main" id="{98035667-D708-4EC6-9CBE-175FAE8C0FEC}"/>
+              </a:ext>
+            </a:extLst>
+          </p:cNvPr>
+          <p:cNvSpPr txBox="1"/>
+          <p:nvPr/>
+        </p:nvSpPr>
+        <p:spPr>
+          <a:xfrm>
+            <a:off x="112730" y="2442381"/>
+            <a:ext cx="1961067" cy="646331"/>
+          </a:xfrm>
+          <a:prstGeom prst="rect">
+            <a:avLst/>
+          </a:prstGeom>
+          <a:noFill/>
+        </p:spPr>
+        <p:txBody>
+          <a:bodyPr wrap="square" rtlCol="0">
+            <a:spAutoFit/>
+          </a:bodyPr>
+          <a:lstStyle/>
+          <a:p>
+            <a:pPr algn="ctr"/>
+            <a:r>
+              <a:rPr lang="en-US" dirty="0"/>
+              <a:t>3. Unlink the app from the v3 node</a:t>
+            </a:r>
+          </a:p>
+        </p:txBody>
+      </p:sp>
     </p:spTree>
     <p:extLst>
       <p:ext uri="{BB962C8B-B14F-4D97-AF65-F5344CB8AC3E}">

</xml_diff>